<commit_message>
Update Readme & Tech Plan
</commit_message>
<xml_diff>
--- a/ressources/TechnologicalPlan.pptx
+++ b/ressources/TechnologicalPlan.pptx
@@ -3142,8 +3142,8 @@
           <a:p>
             <a:pPr algn="ctr"/>
             <a:r>
-              <a:rPr lang="fr-FR" sz="1600" dirty="0" err="1" smtClean="0"/>
-              <a:t>Remote</a:t>
+              <a:rPr lang="fr-FR" sz="1600" dirty="0" smtClean="0"/>
+              <a:t>Server</a:t>
             </a:r>
             <a:endParaRPr lang="fr-FR" sz="1600" dirty="0"/>
           </a:p>
@@ -3707,9 +3707,9 @@
           <p:nvPr/>
         </p:nvSpPr>
         <p:spPr>
-          <a:xfrm>
-            <a:off x="4224887" y="5305142"/>
-            <a:ext cx="3639053" cy="297933"/>
+          <a:xfrm rot="5400000">
+            <a:off x="7747151" y="4109875"/>
+            <a:ext cx="1697241" cy="297933"/>
           </a:xfrm>
           <a:prstGeom prst="rightArrow">
             <a:avLst/>
@@ -3906,14 +3906,14 @@
       </p:sp>
       <p:sp>
         <p:nvSpPr>
-          <p:cNvPr id="34" name="Rectangle à coins arrondis 33"/>
+          <p:cNvPr id="37" name="Rectangle à coins arrondis 36"/>
           <p:cNvSpPr/>
           <p:nvPr/>
         </p:nvSpPr>
         <p:spPr>
           <a:xfrm>
-            <a:off x="5697495" y="5290055"/>
-            <a:ext cx="1414741" cy="283897"/>
+            <a:off x="9787479" y="3032746"/>
+            <a:ext cx="688063" cy="283897"/>
           </a:xfrm>
           <a:prstGeom prst="roundRect">
             <a:avLst/>
@@ -3955,11 +3955,7 @@
             <a:pPr algn="ctr"/>
             <a:r>
               <a:rPr lang="fr-FR" sz="1200" dirty="0" smtClean="0"/>
-              <a:t>Data </a:t>
-            </a:r>
-            <a:r>
-              <a:rPr lang="fr-FR" sz="1200" dirty="0" err="1" smtClean="0"/>
-              <a:t>rendering</a:t>
+              <a:t>Update</a:t>
             </a:r>
             <a:endParaRPr lang="fr-FR" sz="1200" dirty="0"/>
           </a:p>
@@ -3967,14 +3963,112 @@
       </p:sp>
       <p:sp>
         <p:nvSpPr>
-          <p:cNvPr id="37" name="Rectangle à coins arrondis 36"/>
+          <p:cNvPr id="38" name="Flèche droite 37"/>
           <p:cNvSpPr/>
           <p:nvPr/>
         </p:nvSpPr>
         <p:spPr>
+          <a:xfrm rot="10800000">
+            <a:off x="1508227" y="3022109"/>
+            <a:ext cx="852605" cy="283896"/>
+          </a:xfrm>
+          <a:prstGeom prst="rightArrow">
+            <a:avLst/>
+          </a:prstGeom>
+          <a:solidFill>
+            <a:schemeClr val="accent2">
+              <a:lumMod val="60000"/>
+              <a:lumOff val="40000"/>
+            </a:schemeClr>
+          </a:solidFill>
+          <a:ln>
+            <a:noFill/>
+          </a:ln>
+        </p:spPr>
+        <p:style>
+          <a:lnRef idx="2">
+            <a:schemeClr val="accent1">
+              <a:shade val="50000"/>
+            </a:schemeClr>
+          </a:lnRef>
+          <a:fillRef idx="1">
+            <a:schemeClr val="accent1"/>
+          </a:fillRef>
+          <a:effectRef idx="0">
+            <a:schemeClr val="accent1"/>
+          </a:effectRef>
+          <a:fontRef idx="minor">
+            <a:schemeClr val="lt1"/>
+          </a:fontRef>
+        </p:style>
+        <p:txBody>
+          <a:bodyPr rtlCol="0" anchor="ctr"/>
+          <a:lstStyle/>
+          <a:p>
+            <a:pPr algn="ctr"/>
+            <a:endParaRPr lang="fr-FR"/>
+          </a:p>
+        </p:txBody>
+      </p:sp>
+      <p:sp>
+        <p:nvSpPr>
+          <p:cNvPr id="41" name="Flèche droite 40"/>
+          <p:cNvSpPr/>
+          <p:nvPr/>
+        </p:nvSpPr>
+        <p:spPr>
           <a:xfrm>
-            <a:off x="9787479" y="3032746"/>
-            <a:ext cx="688063" cy="283897"/>
+            <a:off x="3098309" y="3024629"/>
+            <a:ext cx="403217" cy="283896"/>
+          </a:xfrm>
+          <a:prstGeom prst="rightArrow">
+            <a:avLst/>
+          </a:prstGeom>
+          <a:solidFill>
+            <a:schemeClr val="accent2">
+              <a:lumMod val="60000"/>
+              <a:lumOff val="40000"/>
+            </a:schemeClr>
+          </a:solidFill>
+          <a:ln>
+            <a:noFill/>
+          </a:ln>
+        </p:spPr>
+        <p:style>
+          <a:lnRef idx="2">
+            <a:schemeClr val="accent1">
+              <a:shade val="50000"/>
+            </a:schemeClr>
+          </a:lnRef>
+          <a:fillRef idx="1">
+            <a:schemeClr val="accent1"/>
+          </a:fillRef>
+          <a:effectRef idx="0">
+            <a:schemeClr val="accent1"/>
+          </a:effectRef>
+          <a:fontRef idx="minor">
+            <a:schemeClr val="lt1"/>
+          </a:fontRef>
+        </p:style>
+        <p:txBody>
+          <a:bodyPr rtlCol="0" anchor="ctr"/>
+          <a:lstStyle/>
+          <a:p>
+            <a:pPr algn="ctr"/>
+            <a:endParaRPr lang="fr-FR"/>
+          </a:p>
+        </p:txBody>
+      </p:sp>
+      <p:sp>
+        <p:nvSpPr>
+          <p:cNvPr id="40" name="Rectangle à coins arrondis 39"/>
+          <p:cNvSpPr/>
+          <p:nvPr/>
+        </p:nvSpPr>
+        <p:spPr>
+          <a:xfrm>
+            <a:off x="1796154" y="3013872"/>
+            <a:ext cx="1414741" cy="283897"/>
           </a:xfrm>
           <a:prstGeom prst="roundRect">
             <a:avLst/>
@@ -4016,7 +4110,7 @@
             <a:pPr algn="ctr"/>
             <a:r>
               <a:rPr lang="fr-FR" sz="1200" dirty="0" smtClean="0"/>
-              <a:t>Update</a:t>
+              <a:t>Data modifications</a:t>
             </a:r>
             <a:endParaRPr lang="fr-FR" sz="1200" dirty="0"/>
           </a:p>
@@ -4024,14 +4118,54 @@
       </p:sp>
       <p:sp>
         <p:nvSpPr>
-          <p:cNvPr id="38" name="Flèche droite 37"/>
+          <p:cNvPr id="43" name="ZoneTexte 42"/>
+          <p:cNvSpPr txBox="1"/>
+          <p:nvPr/>
+        </p:nvSpPr>
+        <p:spPr>
+          <a:xfrm>
+            <a:off x="7418176" y="813072"/>
+            <a:ext cx="4559640" cy="369332"/>
+          </a:xfrm>
+          <a:prstGeom prst="rect">
+            <a:avLst/>
+          </a:prstGeom>
+          <a:solidFill>
+            <a:schemeClr val="accent6">
+              <a:lumMod val="40000"/>
+              <a:lumOff val="60000"/>
+            </a:schemeClr>
+          </a:solidFill>
+          <a:ln w="12700">
+            <a:solidFill>
+              <a:schemeClr val="tx2"/>
+            </a:solidFill>
+          </a:ln>
+        </p:spPr>
+        <p:txBody>
+          <a:bodyPr wrap="square" rtlCol="0">
+            <a:spAutoFit/>
+          </a:bodyPr>
+          <a:lstStyle/>
+          <a:p>
+            <a:pPr algn="ctr"/>
+            <a:r>
+              <a:rPr lang="fr-FR" dirty="0" smtClean="0"/>
+              <a:t>Server</a:t>
+            </a:r>
+          </a:p>
+        </p:txBody>
+      </p:sp>
+      <p:sp>
+        <p:nvSpPr>
+          <p:cNvPr id="44" name="Flèche droite 43"/>
           <p:cNvSpPr/>
           <p:nvPr/>
         </p:nvSpPr>
         <p:spPr>
-          <a:xfrm rot="10800000">
-            <a:off x="1508227" y="3022109"/>
-            <a:ext cx="852605" cy="283896"/>
+          <a:xfrm rot="16200000">
+            <a:off x="821693" y="3493187"/>
+            <a:ext cx="450511" cy="284578"/>
           </a:xfrm>
           <a:prstGeom prst="rightArrow">
             <a:avLst/>
@@ -4073,14 +4207,14 @@
       </p:sp>
       <p:sp>
         <p:nvSpPr>
-          <p:cNvPr id="41" name="Flèche droite 40"/>
+          <p:cNvPr id="45" name="Flèche droite 44"/>
           <p:cNvSpPr/>
           <p:nvPr/>
         </p:nvSpPr>
         <p:spPr>
-          <a:xfrm>
-            <a:off x="3098309" y="3024629"/>
-            <a:ext cx="403217" cy="283896"/>
+          <a:xfrm rot="5400000">
+            <a:off x="843886" y="4119192"/>
+            <a:ext cx="406125" cy="284578"/>
           </a:xfrm>
           <a:prstGeom prst="rightArrow">
             <a:avLst/>
@@ -4122,14 +4256,14 @@
       </p:sp>
       <p:sp>
         <p:nvSpPr>
-          <p:cNvPr id="40" name="Rectangle à coins arrondis 39"/>
+          <p:cNvPr id="46" name="Rectangle à coins arrondis 45"/>
           <p:cNvSpPr/>
           <p:nvPr/>
         </p:nvSpPr>
         <p:spPr>
           <a:xfrm>
-            <a:off x="1796154" y="3013872"/>
-            <a:ext cx="1414741" cy="283897"/>
+            <a:off x="684154" y="3786653"/>
+            <a:ext cx="688063" cy="283897"/>
           </a:xfrm>
           <a:prstGeom prst="roundRect">
             <a:avLst/>
@@ -4171,7 +4305,7 @@
             <a:pPr algn="ctr"/>
             <a:r>
               <a:rPr lang="fr-FR" sz="1200" dirty="0" smtClean="0"/>
-              <a:t>Data modifications</a:t>
+              <a:t>Update</a:t>
             </a:r>
             <a:endParaRPr lang="fr-FR" sz="1200" dirty="0"/>
           </a:p>
@@ -4179,67 +4313,18 @@
       </p:sp>
       <p:sp>
         <p:nvSpPr>
-          <p:cNvPr id="43" name="ZoneTexte 42"/>
-          <p:cNvSpPr txBox="1"/>
+          <p:cNvPr id="47" name="Rectangle 46"/>
+          <p:cNvSpPr/>
           <p:nvPr/>
         </p:nvSpPr>
         <p:spPr>
           <a:xfrm>
-            <a:off x="7418176" y="813072"/>
-            <a:ext cx="4559640" cy="369332"/>
+            <a:off x="7951609" y="1259408"/>
+            <a:ext cx="1482811" cy="790834"/>
           </a:xfrm>
           <a:prstGeom prst="rect">
             <a:avLst/>
           </a:prstGeom>
-          <a:solidFill>
-            <a:schemeClr val="accent6">
-              <a:lumMod val="40000"/>
-              <a:lumOff val="60000"/>
-            </a:schemeClr>
-          </a:solidFill>
-          <a:ln w="12700">
-            <a:solidFill>
-              <a:schemeClr val="tx2"/>
-            </a:solidFill>
-          </a:ln>
-        </p:spPr>
-        <p:txBody>
-          <a:bodyPr wrap="square" rtlCol="0">
-            <a:spAutoFit/>
-          </a:bodyPr>
-          <a:lstStyle/>
-          <a:p>
-            <a:pPr algn="ctr"/>
-            <a:r>
-              <a:rPr lang="fr-FR" dirty="0" smtClean="0"/>
-              <a:t>Server</a:t>
-            </a:r>
-          </a:p>
-        </p:txBody>
-      </p:sp>
-      <p:sp>
-        <p:nvSpPr>
-          <p:cNvPr id="44" name="Flèche droite 43"/>
-          <p:cNvSpPr/>
-          <p:nvPr/>
-        </p:nvSpPr>
-        <p:spPr>
-          <a:xfrm rot="16200000">
-            <a:off x="821693" y="3493187"/>
-            <a:ext cx="450511" cy="284578"/>
-          </a:xfrm>
-          <a:prstGeom prst="rightArrow">
-            <a:avLst/>
-          </a:prstGeom>
-          <a:solidFill>
-            <a:schemeClr val="accent2">
-              <a:lumMod val="60000"/>
-              <a:lumOff val="40000"/>
-            </a:schemeClr>
-          </a:solidFill>
-          <a:ln>
-            <a:noFill/>
-          </a:ln>
         </p:spPr>
         <p:style>
           <a:lnRef idx="2">
@@ -4262,22 +4347,90 @@
           <a:lstStyle/>
           <a:p>
             <a:pPr algn="ctr"/>
-            <a:endParaRPr lang="fr-FR"/>
-          </a:p>
-        </p:txBody>
-      </p:sp>
-      <p:sp>
-        <p:nvSpPr>
-          <p:cNvPr id="45" name="Flèche droite 44"/>
+            <a:r>
+              <a:rPr lang="fr-FR" dirty="0" smtClean="0"/>
+              <a:t>Server App</a:t>
+            </a:r>
+            <a:endParaRPr lang="fr-FR" dirty="0"/>
+          </a:p>
+        </p:txBody>
+      </p:sp>
+      <p:sp>
+        <p:nvSpPr>
+          <p:cNvPr id="15" name="ZoneTexte 14"/>
+          <p:cNvSpPr txBox="1"/>
+          <p:nvPr/>
+        </p:nvSpPr>
+        <p:spPr>
+          <a:xfrm>
+            <a:off x="7940963" y="1936747"/>
+            <a:ext cx="1493458" cy="369332"/>
+          </a:xfrm>
+          <a:prstGeom prst="rect">
+            <a:avLst/>
+          </a:prstGeom>
+          <a:solidFill>
+            <a:schemeClr val="accent5">
+              <a:lumMod val="75000"/>
+            </a:schemeClr>
+          </a:solidFill>
+          <a:ln w="6350">
+            <a:solidFill>
+              <a:schemeClr val="tx2"/>
+            </a:solidFill>
+          </a:ln>
+        </p:spPr>
+        <p:txBody>
+          <a:bodyPr wrap="square" rtlCol="0">
+            <a:spAutoFit/>
+          </a:bodyPr>
+          <a:lstStyle/>
+          <a:p>
+            <a:pPr algn="ctr"/>
+            <a:r>
+              <a:rPr lang="fr-FR" dirty="0" err="1" smtClean="0">
+                <a:solidFill>
+                  <a:schemeClr val="bg1"/>
+                </a:solidFill>
+              </a:rPr>
+              <a:t>Node</a:t>
+            </a:r>
+            <a:r>
+              <a:rPr lang="fr-FR" dirty="0">
+                <a:solidFill>
+                  <a:schemeClr val="bg1"/>
+                </a:solidFill>
+              </a:rPr>
+              <a:t> </a:t>
+            </a:r>
+            <a:r>
+              <a:rPr lang="fr-FR" dirty="0" smtClean="0">
+                <a:solidFill>
+                  <a:schemeClr val="bg1"/>
+                </a:solidFill>
+              </a:rPr>
+              <a:t>JS</a:t>
+            </a:r>
+            <a:endParaRPr lang="fr-FR" dirty="0">
+              <a:solidFill>
+                <a:schemeClr val="bg1"/>
+              </a:solidFill>
+            </a:endParaRPr>
+          </a:p>
+        </p:txBody>
+      </p:sp>
+      <p:sp>
+        <p:nvSpPr>
+          <p:cNvPr id="2" name="Rectangle 1"/>
           <p:cNvSpPr/>
           <p:nvPr/>
         </p:nvSpPr>
         <p:spPr>
-          <a:xfrm rot="5400000">
-            <a:off x="843886" y="4119192"/>
-            <a:ext cx="406125" cy="284578"/>
-          </a:xfrm>
-          <a:prstGeom prst="rightArrow">
+          <a:xfrm>
+            <a:off x="4176584" y="5354425"/>
+            <a:ext cx="3765105" cy="171631"/>
+          </a:xfrm>
+          <a:prstGeom prst="rect">
             <a:avLst/>
           </a:prstGeom>
           <a:solidFill>
@@ -4317,14 +4470,14 @@
       </p:sp>
       <p:sp>
         <p:nvSpPr>
-          <p:cNvPr id="46" name="Rectangle à coins arrondis 45"/>
+          <p:cNvPr id="34" name="Rectangle à coins arrondis 33"/>
           <p:cNvSpPr/>
           <p:nvPr/>
         </p:nvSpPr>
         <p:spPr>
           <a:xfrm>
-            <a:off x="684154" y="3786653"/>
-            <a:ext cx="688063" cy="283897"/>
+            <a:off x="5697495" y="5290055"/>
+            <a:ext cx="1414741" cy="283897"/>
           </a:xfrm>
           <a:prstGeom prst="roundRect">
             <a:avLst/>
@@ -4366,117 +4519,13 @@
             <a:pPr algn="ctr"/>
             <a:r>
               <a:rPr lang="fr-FR" sz="1200" dirty="0" smtClean="0"/>
-              <a:t>Update</a:t>
+              <a:t>Data </a:t>
+            </a:r>
+            <a:r>
+              <a:rPr lang="fr-FR" sz="1200" dirty="0" err="1" smtClean="0"/>
+              <a:t>rendering</a:t>
             </a:r>
             <a:endParaRPr lang="fr-FR" sz="1200" dirty="0"/>
-          </a:p>
-        </p:txBody>
-      </p:sp>
-      <p:sp>
-        <p:nvSpPr>
-          <p:cNvPr id="47" name="Rectangle 46"/>
-          <p:cNvSpPr/>
-          <p:nvPr/>
-        </p:nvSpPr>
-        <p:spPr>
-          <a:xfrm>
-            <a:off x="7951609" y="1259408"/>
-            <a:ext cx="1482811" cy="790834"/>
-          </a:xfrm>
-          <a:prstGeom prst="rect">
-            <a:avLst/>
-          </a:prstGeom>
-        </p:spPr>
-        <p:style>
-          <a:lnRef idx="2">
-            <a:schemeClr val="accent1">
-              <a:shade val="50000"/>
-            </a:schemeClr>
-          </a:lnRef>
-          <a:fillRef idx="1">
-            <a:schemeClr val="accent1"/>
-          </a:fillRef>
-          <a:effectRef idx="0">
-            <a:schemeClr val="accent1"/>
-          </a:effectRef>
-          <a:fontRef idx="minor">
-            <a:schemeClr val="lt1"/>
-          </a:fontRef>
-        </p:style>
-        <p:txBody>
-          <a:bodyPr rtlCol="0" anchor="ctr"/>
-          <a:lstStyle/>
-          <a:p>
-            <a:pPr algn="ctr"/>
-            <a:r>
-              <a:rPr lang="fr-FR" dirty="0" smtClean="0"/>
-              <a:t>Server App</a:t>
-            </a:r>
-            <a:endParaRPr lang="fr-FR" dirty="0"/>
-          </a:p>
-        </p:txBody>
-      </p:sp>
-      <p:sp>
-        <p:nvSpPr>
-          <p:cNvPr id="15" name="ZoneTexte 14"/>
-          <p:cNvSpPr txBox="1"/>
-          <p:nvPr/>
-        </p:nvSpPr>
-        <p:spPr>
-          <a:xfrm>
-            <a:off x="7940963" y="1936747"/>
-            <a:ext cx="1493458" cy="369332"/>
-          </a:xfrm>
-          <a:prstGeom prst="rect">
-            <a:avLst/>
-          </a:prstGeom>
-          <a:solidFill>
-            <a:schemeClr val="accent5">
-              <a:lumMod val="75000"/>
-            </a:schemeClr>
-          </a:solidFill>
-          <a:ln w="6350">
-            <a:solidFill>
-              <a:schemeClr val="tx2"/>
-            </a:solidFill>
-          </a:ln>
-        </p:spPr>
-        <p:txBody>
-          <a:bodyPr wrap="square" rtlCol="0">
-            <a:spAutoFit/>
-          </a:bodyPr>
-          <a:lstStyle/>
-          <a:p>
-            <a:pPr algn="ctr"/>
-            <a:r>
-              <a:rPr lang="fr-FR" dirty="0" err="1" smtClean="0">
-                <a:solidFill>
-                  <a:schemeClr val="bg1"/>
-                </a:solidFill>
-              </a:rPr>
-              <a:t>Node</a:t>
-            </a:r>
-            <a:r>
-              <a:rPr lang="fr-FR" dirty="0">
-                <a:solidFill>
-                  <a:schemeClr val="bg1"/>
-                </a:solidFill>
-              </a:rPr>
-              <a:t> </a:t>
-            </a:r>
-            <a:r>
-              <a:rPr lang="fr-FR" dirty="0" smtClean="0">
-                <a:solidFill>
-                  <a:schemeClr val="bg1"/>
-                </a:solidFill>
-              </a:rPr>
-              <a:t>JS</a:t>
-            </a:r>
-            <a:endParaRPr lang="fr-FR" dirty="0">
-              <a:solidFill>
-                <a:schemeClr val="bg1"/>
-              </a:solidFill>
-            </a:endParaRPr>
           </a:p>
         </p:txBody>
       </p:sp>

</xml_diff>